<commit_message>
Almost done with first chapter
</commit_message>
<xml_diff>
--- a/BEC_DFG figures/CondensingAtoms.pptx
+++ b/BEC_DFG figures/CondensingAtoms.pptx
@@ -107,6 +107,11 @@
       </a:defRPr>
     </a:lvl9pPr>
   </p:defaultTextStyle>
+  <p:extLst>
+    <p:ext uri="{EFAFB233-063F-42B5-8137-9DF3F51BA10A}">
+      <p15:sldGuideLst xmlns:p15="http://schemas.microsoft.com/office/powerpoint/2012/main"/>
+    </p:ext>
+  </p:extLst>
 </p:presentation>
 </file>
 
@@ -192,7 +197,7 @@
           <a:p>
             <a:fld id="{8089F320-D45F-40B1-98E8-319FAD79506D}" type="datetimeFigureOut">
               <a:rPr lang="en-US" smtClean="0"/>
-              <a:t>11/30/2018</a:t>
+              <a:t>1/27/2019</a:t>
             </a:fld>
             <a:endParaRPr lang="en-US"/>
           </a:p>
@@ -689,7 +694,7 @@
           <a:p>
             <a:fld id="{11F06626-AD47-40A1-BBE7-FF3A208CFB3A}" type="datetimeFigureOut">
               <a:rPr lang="en-US" smtClean="0"/>
-              <a:t>11/30/2018</a:t>
+              <a:t>1/27/2019</a:t>
             </a:fld>
             <a:endParaRPr lang="en-US"/>
           </a:p>
@@ -859,7 +864,7 @@
           <a:p>
             <a:fld id="{11F06626-AD47-40A1-BBE7-FF3A208CFB3A}" type="datetimeFigureOut">
               <a:rPr lang="en-US" smtClean="0"/>
-              <a:t>11/30/2018</a:t>
+              <a:t>1/27/2019</a:t>
             </a:fld>
             <a:endParaRPr lang="en-US"/>
           </a:p>
@@ -1039,7 +1044,7 @@
           <a:p>
             <a:fld id="{11F06626-AD47-40A1-BBE7-FF3A208CFB3A}" type="datetimeFigureOut">
               <a:rPr lang="en-US" smtClean="0"/>
-              <a:t>11/30/2018</a:t>
+              <a:t>1/27/2019</a:t>
             </a:fld>
             <a:endParaRPr lang="en-US"/>
           </a:p>
@@ -1209,7 +1214,7 @@
           <a:p>
             <a:fld id="{11F06626-AD47-40A1-BBE7-FF3A208CFB3A}" type="datetimeFigureOut">
               <a:rPr lang="en-US" smtClean="0"/>
-              <a:t>11/30/2018</a:t>
+              <a:t>1/27/2019</a:t>
             </a:fld>
             <a:endParaRPr lang="en-US"/>
           </a:p>
@@ -1455,7 +1460,7 @@
           <a:p>
             <a:fld id="{11F06626-AD47-40A1-BBE7-FF3A208CFB3A}" type="datetimeFigureOut">
               <a:rPr lang="en-US" smtClean="0"/>
-              <a:t>11/30/2018</a:t>
+              <a:t>1/27/2019</a:t>
             </a:fld>
             <a:endParaRPr lang="en-US"/>
           </a:p>
@@ -1687,7 +1692,7 @@
           <a:p>
             <a:fld id="{11F06626-AD47-40A1-BBE7-FF3A208CFB3A}" type="datetimeFigureOut">
               <a:rPr lang="en-US" smtClean="0"/>
-              <a:t>11/30/2018</a:t>
+              <a:t>1/27/2019</a:t>
             </a:fld>
             <a:endParaRPr lang="en-US"/>
           </a:p>
@@ -2054,7 +2059,7 @@
           <a:p>
             <a:fld id="{11F06626-AD47-40A1-BBE7-FF3A208CFB3A}" type="datetimeFigureOut">
               <a:rPr lang="en-US" smtClean="0"/>
-              <a:t>11/30/2018</a:t>
+              <a:t>1/27/2019</a:t>
             </a:fld>
             <a:endParaRPr lang="en-US"/>
           </a:p>
@@ -2172,7 +2177,7 @@
           <a:p>
             <a:fld id="{11F06626-AD47-40A1-BBE7-FF3A208CFB3A}" type="datetimeFigureOut">
               <a:rPr lang="en-US" smtClean="0"/>
-              <a:t>11/30/2018</a:t>
+              <a:t>1/27/2019</a:t>
             </a:fld>
             <a:endParaRPr lang="en-US"/>
           </a:p>
@@ -2267,7 +2272,7 @@
           <a:p>
             <a:fld id="{11F06626-AD47-40A1-BBE7-FF3A208CFB3A}" type="datetimeFigureOut">
               <a:rPr lang="en-US" smtClean="0"/>
-              <a:t>11/30/2018</a:t>
+              <a:t>1/27/2019</a:t>
             </a:fld>
             <a:endParaRPr lang="en-US"/>
           </a:p>
@@ -2544,7 +2549,7 @@
           <a:p>
             <a:fld id="{11F06626-AD47-40A1-BBE7-FF3A208CFB3A}" type="datetimeFigureOut">
               <a:rPr lang="en-US" smtClean="0"/>
-              <a:t>11/30/2018</a:t>
+              <a:t>1/27/2019</a:t>
             </a:fld>
             <a:endParaRPr lang="en-US"/>
           </a:p>
@@ -2797,7 +2802,7 @@
           <a:p>
             <a:fld id="{11F06626-AD47-40A1-BBE7-FF3A208CFB3A}" type="datetimeFigureOut">
               <a:rPr lang="en-US" smtClean="0"/>
-              <a:t>11/30/2018</a:t>
+              <a:t>1/27/2019</a:t>
             </a:fld>
             <a:endParaRPr lang="en-US"/>
           </a:p>
@@ -3010,7 +3015,7 @@
           <a:p>
             <a:fld id="{11F06626-AD47-40A1-BBE7-FF3A208CFB3A}" type="datetimeFigureOut">
               <a:rPr lang="en-US" smtClean="0"/>
-              <a:t>11/30/2018</a:t>
+              <a:t>1/27/2019</a:t>
             </a:fld>
             <a:endParaRPr lang="en-US"/>
           </a:p>
@@ -3440,228 +3445,291 @@
       </p:sp>
       <p:grpSp>
         <p:nvGrpSpPr>
-          <p:cNvPr id="7" name="Group 6"/>
+          <p:cNvPr id="5" name="Group 4"/>
           <p:cNvGrpSpPr/>
           <p:nvPr/>
         </p:nvGrpSpPr>
         <p:grpSpPr>
           <a:xfrm>
-            <a:off x="2657714" y="2384311"/>
-            <a:ext cx="5397440" cy="1615481"/>
-            <a:chOff x="124064" y="2136661"/>
-            <a:chExt cx="5397440" cy="1615481"/>
+            <a:off x="2575776" y="2228045"/>
+            <a:ext cx="5692462" cy="1957589"/>
+            <a:chOff x="2575776" y="2228045"/>
+            <a:chExt cx="5692462" cy="1957589"/>
           </a:xfrm>
         </p:grpSpPr>
+        <p:sp>
+          <p:nvSpPr>
+            <p:cNvPr id="2" name="Rectangle 1"/>
+            <p:cNvSpPr/>
+            <p:nvPr/>
+          </p:nvSpPr>
+          <p:spPr>
+            <a:xfrm>
+              <a:off x="2575776" y="2228045"/>
+              <a:ext cx="5692462" cy="1957589"/>
+            </a:xfrm>
+            <a:prstGeom prst="rect">
+              <a:avLst/>
+            </a:prstGeom>
+            <a:solidFill>
+              <a:schemeClr val="bg1"/>
+            </a:solidFill>
+            <a:ln>
+              <a:solidFill>
+                <a:schemeClr val="bg1"/>
+              </a:solidFill>
+            </a:ln>
+          </p:spPr>
+          <p:style>
+            <a:lnRef idx="2">
+              <a:schemeClr val="accent1">
+                <a:shade val="50000"/>
+              </a:schemeClr>
+            </a:lnRef>
+            <a:fillRef idx="1">
+              <a:schemeClr val="accent1"/>
+            </a:fillRef>
+            <a:effectRef idx="0">
+              <a:schemeClr val="accent1"/>
+            </a:effectRef>
+            <a:fontRef idx="minor">
+              <a:schemeClr val="lt1"/>
+            </a:fontRef>
+          </p:style>
+          <p:txBody>
+            <a:bodyPr rtlCol="0" anchor="ctr"/>
+            <a:lstStyle/>
+            <a:p>
+              <a:pPr algn="ctr"/>
+              <a:endParaRPr lang="en-US"/>
+            </a:p>
+          </p:txBody>
+        </p:sp>
         <p:grpSp>
           <p:nvGrpSpPr>
-            <p:cNvPr id="4" name="Group 3"/>
+            <p:cNvPr id="7" name="Group 6"/>
             <p:cNvGrpSpPr/>
             <p:nvPr/>
           </p:nvGrpSpPr>
           <p:grpSpPr>
             <a:xfrm>
-              <a:off x="199696" y="2188518"/>
-              <a:ext cx="5321808" cy="1563624"/>
-              <a:chOff x="199696" y="2188518"/>
-              <a:chExt cx="11902679" cy="3474720"/>
+              <a:off x="2747867" y="2384311"/>
+              <a:ext cx="5397440" cy="1615481"/>
+              <a:chOff x="124064" y="2136661"/>
+              <a:chExt cx="5397440" cy="1615481"/>
             </a:xfrm>
           </p:grpSpPr>
-          <p:pic>
-            <p:nvPicPr>
-              <p:cNvPr id="12" name="Picture 11">
-                <a:extLst>
-                  <a:ext uri="{FF2B5EF4-FFF2-40B4-BE49-F238E27FC236}">
-                    <a16:creationId xmlns="" xmlns:a16="http://schemas.microsoft.com/office/drawing/2014/main" id="{4F0C02E3-8892-4A7C-8EF9-CFE34C8136BD}"/>
-                  </a:ext>
-                </a:extLst>
-              </p:cNvPr>
-              <p:cNvPicPr>
-                <a:picLocks noChangeAspect="1"/>
-              </p:cNvPicPr>
+          <p:grpSp>
+            <p:nvGrpSpPr>
+              <p:cNvPr id="4" name="Group 3"/>
+              <p:cNvGrpSpPr/>
               <p:nvPr/>
-            </p:nvPicPr>
-            <p:blipFill rotWithShape="1">
-              <a:blip r:embed="rId3" cstate="print">
-                <a:extLst>
-                  <a:ext uri="{28A0092B-C50C-407E-A947-70E740481C1C}">
-                    <a14:useLocalDpi xmlns:a14="http://schemas.microsoft.com/office/drawing/2010/main" val="0"/>
-                  </a:ext>
-                </a:extLst>
-              </a:blip>
-              <a:srcRect l="20594" t="13725" r="9393" b="10689"/>
-              <a:stretch/>
-            </p:blipFill>
+            </p:nvGrpSpPr>
+            <p:grpSpPr>
+              <a:xfrm>
+                <a:off x="199696" y="2188518"/>
+                <a:ext cx="5321808" cy="1563624"/>
+                <a:chOff x="199696" y="2188518"/>
+                <a:chExt cx="11902679" cy="3474720"/>
+              </a:xfrm>
+            </p:grpSpPr>
+            <p:pic>
+              <p:nvPicPr>
+                <p:cNvPr id="12" name="Picture 11">
+                  <a:extLst>
+                    <a:ext uri="{FF2B5EF4-FFF2-40B4-BE49-F238E27FC236}">
+                      <a16:creationId xmlns:a16="http://schemas.microsoft.com/office/drawing/2014/main" xmlns="" id="{4F0C02E3-8892-4A7C-8EF9-CFE34C8136BD}"/>
+                    </a:ext>
+                  </a:extLst>
+                </p:cNvPr>
+                <p:cNvPicPr>
+                  <a:picLocks noChangeAspect="1"/>
+                </p:cNvPicPr>
+                <p:nvPr/>
+              </p:nvPicPr>
+              <p:blipFill rotWithShape="1">
+                <a:blip r:embed="rId3" cstate="print">
+                  <a:extLst>
+                    <a:ext uri="{28A0092B-C50C-407E-A947-70E740481C1C}">
+                      <a14:useLocalDpi xmlns:a14="http://schemas.microsoft.com/office/drawing/2010/main" val="0"/>
+                    </a:ext>
+                  </a:extLst>
+                </a:blip>
+                <a:srcRect l="20594" t="13725" r="9393" b="10689"/>
+                <a:stretch/>
+              </p:blipFill>
+              <p:spPr>
+                <a:xfrm>
+                  <a:off x="199696" y="2188518"/>
+                  <a:ext cx="4291404" cy="3474720"/>
+                </a:xfrm>
+                <a:prstGeom prst="rect">
+                  <a:avLst/>
+                </a:prstGeom>
+              </p:spPr>
+            </p:pic>
+            <p:pic>
+              <p:nvPicPr>
+                <p:cNvPr id="8" name="Picture 7">
+                  <a:extLst>
+                    <a:ext uri="{FF2B5EF4-FFF2-40B4-BE49-F238E27FC236}">
+                      <a16:creationId xmlns:a16="http://schemas.microsoft.com/office/drawing/2014/main" xmlns="" id="{8FEA8BA2-6317-4ABA-AD42-D68DC8E93483}"/>
+                    </a:ext>
+                  </a:extLst>
+                </p:cNvPr>
+                <p:cNvPicPr>
+                  <a:picLocks noChangeAspect="1"/>
+                </p:cNvPicPr>
+                <p:nvPr/>
+              </p:nvPicPr>
+              <p:blipFill rotWithShape="1">
+                <a:blip r:embed="rId4" cstate="print">
+                  <a:extLst>
+                    <a:ext uri="{28A0092B-C50C-407E-A947-70E740481C1C}">
+                      <a14:useLocalDpi xmlns:a14="http://schemas.microsoft.com/office/drawing/2010/main" val="0"/>
+                    </a:ext>
+                  </a:extLst>
+                </a:blip>
+                <a:srcRect l="19379" t="13172" r="7655" b="9770"/>
+                <a:stretch/>
+              </p:blipFill>
+              <p:spPr>
+                <a:xfrm>
+                  <a:off x="3999765" y="2188518"/>
+                  <a:ext cx="4386937" cy="3474720"/>
+                </a:xfrm>
+                <a:prstGeom prst="rect">
+                  <a:avLst/>
+                </a:prstGeom>
+              </p:spPr>
+            </p:pic>
+            <p:pic>
+              <p:nvPicPr>
+                <p:cNvPr id="10" name="Picture 9">
+                  <a:extLst>
+                    <a:ext uri="{FF2B5EF4-FFF2-40B4-BE49-F238E27FC236}">
+                      <a16:creationId xmlns:a16="http://schemas.microsoft.com/office/drawing/2014/main" xmlns="" id="{403206E6-AB7A-42DC-A49F-B75A470D6148}"/>
+                    </a:ext>
+                  </a:extLst>
+                </p:cNvPr>
+                <p:cNvPicPr>
+                  <a:picLocks noChangeAspect="1"/>
+                </p:cNvPicPr>
+                <p:nvPr/>
+              </p:nvPicPr>
+              <p:blipFill rotWithShape="1">
+                <a:blip r:embed="rId5" cstate="print">
+                  <a:extLst>
+                    <a:ext uri="{28A0092B-C50C-407E-A947-70E740481C1C}">
+                      <a14:useLocalDpi xmlns:a14="http://schemas.microsoft.com/office/drawing/2010/main" val="0"/>
+                    </a:ext>
+                  </a:extLst>
+                </a:blip>
+                <a:srcRect l="22001" t="13357" r="8068" b="9586"/>
+                <a:stretch/>
+              </p:blipFill>
+              <p:spPr>
+                <a:xfrm>
+                  <a:off x="7897881" y="2188518"/>
+                  <a:ext cx="4204494" cy="3474720"/>
+                </a:xfrm>
+                <a:prstGeom prst="rect">
+                  <a:avLst/>
+                </a:prstGeom>
+              </p:spPr>
+            </p:pic>
+          </p:grpSp>
+          <p:sp>
+            <p:nvSpPr>
+              <p:cNvPr id="6" name="TextBox 5"/>
+              <p:cNvSpPr txBox="1"/>
+              <p:nvPr/>
+            </p:nvSpPr>
             <p:spPr>
               <a:xfrm>
-                <a:off x="199696" y="2188518"/>
-                <a:ext cx="4291404" cy="3474720"/>
+                <a:off x="124064" y="2136663"/>
+                <a:ext cx="351378" cy="276999"/>
               </a:xfrm>
               <a:prstGeom prst="rect">
                 <a:avLst/>
               </a:prstGeom>
+              <a:noFill/>
             </p:spPr>
-          </p:pic>
-          <p:pic>
-            <p:nvPicPr>
-              <p:cNvPr id="8" name="Picture 7">
-                <a:extLst>
-                  <a:ext uri="{FF2B5EF4-FFF2-40B4-BE49-F238E27FC236}">
-                    <a16:creationId xmlns="" xmlns:a16="http://schemas.microsoft.com/office/drawing/2014/main" id="{8FEA8BA2-6317-4ABA-AD42-D68DC8E93483}"/>
-                  </a:ext>
-                </a:extLst>
-              </p:cNvPr>
-              <p:cNvPicPr>
-                <a:picLocks noChangeAspect="1"/>
-              </p:cNvPicPr>
+            <p:txBody>
+              <a:bodyPr wrap="none" rtlCol="0">
+                <a:spAutoFit/>
+              </a:bodyPr>
+              <a:lstStyle/>
+              <a:p>
+                <a:r>
+                  <a:rPr lang="en-US" sz="1200" dirty="0" smtClean="0"/>
+                  <a:t>(a)</a:t>
+                </a:r>
+                <a:endParaRPr lang="en-US" sz="1200" dirty="0"/>
+              </a:p>
+            </p:txBody>
+          </p:sp>
+          <p:sp>
+            <p:nvSpPr>
+              <p:cNvPr id="11" name="TextBox 10"/>
+              <p:cNvSpPr txBox="1"/>
               <p:nvPr/>
-            </p:nvPicPr>
-            <p:blipFill rotWithShape="1">
-              <a:blip r:embed="rId4" cstate="print">
-                <a:extLst>
-                  <a:ext uri="{28A0092B-C50C-407E-A947-70E740481C1C}">
-                    <a14:useLocalDpi xmlns:a14="http://schemas.microsoft.com/office/drawing/2010/main" val="0"/>
-                  </a:ext>
-                </a:extLst>
-              </a:blip>
-              <a:srcRect l="19379" t="13172" r="7655" b="9770"/>
-              <a:stretch/>
-            </p:blipFill>
+            </p:nvSpPr>
             <p:spPr>
               <a:xfrm>
-                <a:off x="3999765" y="2188518"/>
-                <a:ext cx="4386937" cy="3474720"/>
+                <a:off x="1898745" y="2136662"/>
+                <a:ext cx="357790" cy="276999"/>
               </a:xfrm>
               <a:prstGeom prst="rect">
                 <a:avLst/>
               </a:prstGeom>
+              <a:noFill/>
             </p:spPr>
-          </p:pic>
-          <p:pic>
-            <p:nvPicPr>
-              <p:cNvPr id="10" name="Picture 9">
-                <a:extLst>
-                  <a:ext uri="{FF2B5EF4-FFF2-40B4-BE49-F238E27FC236}">
-                    <a16:creationId xmlns="" xmlns:a16="http://schemas.microsoft.com/office/drawing/2014/main" id="{403206E6-AB7A-42DC-A49F-B75A470D6148}"/>
-                  </a:ext>
-                </a:extLst>
-              </p:cNvPr>
-              <p:cNvPicPr>
-                <a:picLocks noChangeAspect="1"/>
-              </p:cNvPicPr>
+            <p:txBody>
+              <a:bodyPr wrap="none" rtlCol="0">
+                <a:spAutoFit/>
+              </a:bodyPr>
+              <a:lstStyle/>
+              <a:p>
+                <a:r>
+                  <a:rPr lang="en-US" sz="1200" dirty="0" smtClean="0"/>
+                  <a:t>(b)</a:t>
+                </a:r>
+                <a:endParaRPr lang="en-US" sz="1200" dirty="0"/>
+              </a:p>
+            </p:txBody>
+          </p:sp>
+          <p:sp>
+            <p:nvSpPr>
+              <p:cNvPr id="13" name="TextBox 12"/>
+              <p:cNvSpPr txBox="1"/>
               <p:nvPr/>
-            </p:nvPicPr>
-            <p:blipFill rotWithShape="1">
-              <a:blip r:embed="rId5" cstate="print">
-                <a:extLst>
-                  <a:ext uri="{28A0092B-C50C-407E-A947-70E740481C1C}">
-                    <a14:useLocalDpi xmlns:a14="http://schemas.microsoft.com/office/drawing/2010/main" val="0"/>
-                  </a:ext>
-                </a:extLst>
-              </a:blip>
-              <a:srcRect l="22001" t="13357" r="8068" b="9586"/>
-              <a:stretch/>
-            </p:blipFill>
+            </p:nvSpPr>
             <p:spPr>
               <a:xfrm>
-                <a:off x="7897881" y="2188518"/>
-                <a:ext cx="4204494" cy="3474720"/>
+                <a:off x="3541729" y="2136661"/>
+                <a:ext cx="343364" cy="276999"/>
               </a:xfrm>
               <a:prstGeom prst="rect">
                 <a:avLst/>
               </a:prstGeom>
+              <a:noFill/>
             </p:spPr>
-          </p:pic>
+            <p:txBody>
+              <a:bodyPr wrap="none" rtlCol="0">
+                <a:spAutoFit/>
+              </a:bodyPr>
+              <a:lstStyle/>
+              <a:p>
+                <a:r>
+                  <a:rPr lang="en-US" sz="1200" dirty="0" smtClean="0"/>
+                  <a:t>(c)</a:t>
+                </a:r>
+                <a:endParaRPr lang="en-US" sz="1200" dirty="0"/>
+              </a:p>
+            </p:txBody>
+          </p:sp>
         </p:grpSp>
-        <p:sp>
-          <p:nvSpPr>
-            <p:cNvPr id="6" name="TextBox 5"/>
-            <p:cNvSpPr txBox="1"/>
-            <p:nvPr/>
-          </p:nvSpPr>
-          <p:spPr>
-            <a:xfrm>
-              <a:off x="124064" y="2136663"/>
-              <a:ext cx="351378" cy="276999"/>
-            </a:xfrm>
-            <a:prstGeom prst="rect">
-              <a:avLst/>
-            </a:prstGeom>
-            <a:noFill/>
-          </p:spPr>
-          <p:txBody>
-            <a:bodyPr wrap="none" rtlCol="0">
-              <a:spAutoFit/>
-            </a:bodyPr>
-            <a:lstStyle/>
-            <a:p>
-              <a:r>
-                <a:rPr lang="en-US" sz="1200" dirty="0" smtClean="0"/>
-                <a:t>(a)</a:t>
-              </a:r>
-              <a:endParaRPr lang="en-US" sz="1200" dirty="0"/>
-            </a:p>
-          </p:txBody>
-        </p:sp>
-        <p:sp>
-          <p:nvSpPr>
-            <p:cNvPr id="11" name="TextBox 10"/>
-            <p:cNvSpPr txBox="1"/>
-            <p:nvPr/>
-          </p:nvSpPr>
-          <p:spPr>
-            <a:xfrm>
-              <a:off x="1898745" y="2136662"/>
-              <a:ext cx="357790" cy="276999"/>
-            </a:xfrm>
-            <a:prstGeom prst="rect">
-              <a:avLst/>
-            </a:prstGeom>
-            <a:noFill/>
-          </p:spPr>
-          <p:txBody>
-            <a:bodyPr wrap="none" rtlCol="0">
-              <a:spAutoFit/>
-            </a:bodyPr>
-            <a:lstStyle/>
-            <a:p>
-              <a:r>
-                <a:rPr lang="en-US" sz="1200" dirty="0" smtClean="0"/>
-                <a:t>(b)</a:t>
-              </a:r>
-              <a:endParaRPr lang="en-US" sz="1200" dirty="0"/>
-            </a:p>
-          </p:txBody>
-        </p:sp>
-        <p:sp>
-          <p:nvSpPr>
-            <p:cNvPr id="13" name="TextBox 12"/>
-            <p:cNvSpPr txBox="1"/>
-            <p:nvPr/>
-          </p:nvSpPr>
-          <p:spPr>
-            <a:xfrm>
-              <a:off x="3541729" y="2136661"/>
-              <a:ext cx="343364" cy="276999"/>
-            </a:xfrm>
-            <a:prstGeom prst="rect">
-              <a:avLst/>
-            </a:prstGeom>
-            <a:noFill/>
-          </p:spPr>
-          <p:txBody>
-            <a:bodyPr wrap="none" rtlCol="0">
-              <a:spAutoFit/>
-            </a:bodyPr>
-            <a:lstStyle/>
-            <a:p>
-              <a:r>
-                <a:rPr lang="en-US" sz="1200" dirty="0" smtClean="0"/>
-                <a:t>(c)</a:t>
-              </a:r>
-              <a:endParaRPr lang="en-US" sz="1200" dirty="0"/>
-            </a:p>
-          </p:txBody>
-        </p:sp>
       </p:grpSp>
     </p:spTree>
     <p:extLst>

</xml_diff>